<commit_message>
Updating output for meeting with MBrett
</commit_message>
<xml_diff>
--- a/WatershedLoading_20210301.pptx
+++ b/WatershedLoading_20210301.pptx
@@ -6,12 +6,12 @@
   </p:sldMasterIdLst>
   <p:sldIdLst>
     <p:sldId id="258" r:id="rId2"/>
-    <p:sldId id="257" r:id="rId3"/>
-    <p:sldId id="259" r:id="rId4"/>
-    <p:sldId id="260" r:id="rId5"/>
-    <p:sldId id="262" r:id="rId6"/>
-    <p:sldId id="261" r:id="rId7"/>
-    <p:sldId id="263" r:id="rId8"/>
+    <p:sldId id="262" r:id="rId3"/>
+    <p:sldId id="261" r:id="rId4"/>
+    <p:sldId id="263" r:id="rId5"/>
+    <p:sldId id="257" r:id="rId6"/>
+    <p:sldId id="259" r:id="rId7"/>
+    <p:sldId id="260" r:id="rId8"/>
   </p:sldIdLst>
   <p:sldSz cx="12192000" cy="6858000"/>
   <p:notesSz cx="6858000" cy="9144000"/>
@@ -265,7 +265,7 @@
           <a:p>
             <a:fld id="{50461792-5294-46A5-9023-21DFB6878596}" type="datetimeFigureOut">
               <a:rPr lang="en-US" smtClean="0"/>
-              <a:t>3/1/2021</a:t>
+              <a:t>3/2/2021</a:t>
             </a:fld>
             <a:endParaRPr lang="en-US"/>
           </a:p>
@@ -463,7 +463,7 @@
           <a:p>
             <a:fld id="{50461792-5294-46A5-9023-21DFB6878596}" type="datetimeFigureOut">
               <a:rPr lang="en-US" smtClean="0"/>
-              <a:t>3/1/2021</a:t>
+              <a:t>3/2/2021</a:t>
             </a:fld>
             <a:endParaRPr lang="en-US"/>
           </a:p>
@@ -671,7 +671,7 @@
           <a:p>
             <a:fld id="{50461792-5294-46A5-9023-21DFB6878596}" type="datetimeFigureOut">
               <a:rPr lang="en-US" smtClean="0"/>
-              <a:t>3/1/2021</a:t>
+              <a:t>3/2/2021</a:t>
             </a:fld>
             <a:endParaRPr lang="en-US"/>
           </a:p>
@@ -869,7 +869,7 @@
           <a:p>
             <a:fld id="{50461792-5294-46A5-9023-21DFB6878596}" type="datetimeFigureOut">
               <a:rPr lang="en-US" smtClean="0"/>
-              <a:t>3/1/2021</a:t>
+              <a:t>3/2/2021</a:t>
             </a:fld>
             <a:endParaRPr lang="en-US"/>
           </a:p>
@@ -1144,7 +1144,7 @@
           <a:p>
             <a:fld id="{50461792-5294-46A5-9023-21DFB6878596}" type="datetimeFigureOut">
               <a:rPr lang="en-US" smtClean="0"/>
-              <a:t>3/1/2021</a:t>
+              <a:t>3/2/2021</a:t>
             </a:fld>
             <a:endParaRPr lang="en-US"/>
           </a:p>
@@ -1409,7 +1409,7 @@
           <a:p>
             <a:fld id="{50461792-5294-46A5-9023-21DFB6878596}" type="datetimeFigureOut">
               <a:rPr lang="en-US" smtClean="0"/>
-              <a:t>3/1/2021</a:t>
+              <a:t>3/2/2021</a:t>
             </a:fld>
             <a:endParaRPr lang="en-US"/>
           </a:p>
@@ -1821,7 +1821,7 @@
           <a:p>
             <a:fld id="{50461792-5294-46A5-9023-21DFB6878596}" type="datetimeFigureOut">
               <a:rPr lang="en-US" smtClean="0"/>
-              <a:t>3/1/2021</a:t>
+              <a:t>3/2/2021</a:t>
             </a:fld>
             <a:endParaRPr lang="en-US"/>
           </a:p>
@@ -1962,7 +1962,7 @@
           <a:p>
             <a:fld id="{50461792-5294-46A5-9023-21DFB6878596}" type="datetimeFigureOut">
               <a:rPr lang="en-US" smtClean="0"/>
-              <a:t>3/1/2021</a:t>
+              <a:t>3/2/2021</a:t>
             </a:fld>
             <a:endParaRPr lang="en-US"/>
           </a:p>
@@ -2075,7 +2075,7 @@
           <a:p>
             <a:fld id="{50461792-5294-46A5-9023-21DFB6878596}" type="datetimeFigureOut">
               <a:rPr lang="en-US" smtClean="0"/>
-              <a:t>3/1/2021</a:t>
+              <a:t>3/2/2021</a:t>
             </a:fld>
             <a:endParaRPr lang="en-US"/>
           </a:p>
@@ -2386,7 +2386,7 @@
           <a:p>
             <a:fld id="{50461792-5294-46A5-9023-21DFB6878596}" type="datetimeFigureOut">
               <a:rPr lang="en-US" smtClean="0"/>
-              <a:t>3/1/2021</a:t>
+              <a:t>3/2/2021</a:t>
             </a:fld>
             <a:endParaRPr lang="en-US"/>
           </a:p>
@@ -2677,7 +2677,7 @@
           <a:p>
             <a:fld id="{50461792-5294-46A5-9023-21DFB6878596}" type="datetimeFigureOut">
               <a:rPr lang="en-US" smtClean="0"/>
-              <a:t>3/1/2021</a:t>
+              <a:t>3/2/2021</a:t>
             </a:fld>
             <a:endParaRPr lang="en-US"/>
           </a:p>
@@ -2918,7 +2918,7 @@
           <a:p>
             <a:fld id="{50461792-5294-46A5-9023-21DFB6878596}" type="datetimeFigureOut">
               <a:rPr lang="en-US" smtClean="0"/>
-              <a:t>3/1/2021</a:t>
+              <a:t>3/2/2021</a:t>
             </a:fld>
             <a:endParaRPr lang="en-US"/>
           </a:p>
@@ -3395,6 +3395,276 @@
           <a:chExt cx="0" cy="0"/>
         </a:xfrm>
       </p:grpSpPr>
+      <p:pic>
+        <p:nvPicPr>
+          <p:cNvPr id="2" name="Picture 1">
+            <a:extLst>
+              <a:ext uri="{FF2B5EF4-FFF2-40B4-BE49-F238E27FC236}">
+                <a16:creationId xmlns:a16="http://schemas.microsoft.com/office/drawing/2014/main" id="{E56CD687-9370-4A06-A7BD-1CE9DADE90D9}"/>
+              </a:ext>
+            </a:extLst>
+          </p:cNvPr>
+          <p:cNvPicPr>
+            <a:picLocks noChangeAspect="1"/>
+          </p:cNvPicPr>
+          <p:nvPr/>
+        </p:nvPicPr>
+        <p:blipFill>
+          <a:blip r:embed="rId2"/>
+          <a:stretch>
+            <a:fillRect/>
+          </a:stretch>
+        </p:blipFill>
+        <p:spPr>
+          <a:xfrm>
+            <a:off x="671904" y="1178172"/>
+            <a:ext cx="6668078" cy="4762913"/>
+          </a:xfrm>
+          <a:prstGeom prst="rect">
+            <a:avLst/>
+          </a:prstGeom>
+        </p:spPr>
+      </p:pic>
+      <p:pic>
+        <p:nvPicPr>
+          <p:cNvPr id="3" name="Picture 2">
+            <a:extLst>
+              <a:ext uri="{FF2B5EF4-FFF2-40B4-BE49-F238E27FC236}">
+                <a16:creationId xmlns:a16="http://schemas.microsoft.com/office/drawing/2014/main" id="{65E2493A-CACF-49E5-8FD5-DED353F2B703}"/>
+              </a:ext>
+            </a:extLst>
+          </p:cNvPr>
+          <p:cNvPicPr>
+            <a:picLocks noChangeAspect="1"/>
+          </p:cNvPicPr>
+          <p:nvPr/>
+        </p:nvPicPr>
+        <p:blipFill>
+          <a:blip r:embed="rId3"/>
+          <a:stretch>
+            <a:fillRect/>
+          </a:stretch>
+        </p:blipFill>
+        <p:spPr>
+          <a:xfrm>
+            <a:off x="7666247" y="1885576"/>
+            <a:ext cx="4275190" cy="3810330"/>
+          </a:xfrm>
+          <a:prstGeom prst="rect">
+            <a:avLst/>
+          </a:prstGeom>
+        </p:spPr>
+      </p:pic>
+    </p:spTree>
+    <p:extLst>
+      <p:ext uri="{BB962C8B-B14F-4D97-AF65-F5344CB8AC3E}">
+        <p14:creationId xmlns:p14="http://schemas.microsoft.com/office/powerpoint/2010/main" val="113611578"/>
+      </p:ext>
+    </p:extLst>
+  </p:cSld>
+  <p:clrMapOvr>
+    <a:masterClrMapping/>
+  </p:clrMapOvr>
+</p:sld>
+</file>
+
+<file path=ppt/slides/slide3.xml><?xml version="1.0" encoding="utf-8"?>
+<p:sld xmlns:a="http://schemas.openxmlformats.org/drawingml/2006/main" xmlns:r="http://schemas.openxmlformats.org/officeDocument/2006/relationships" xmlns:p="http://schemas.openxmlformats.org/presentationml/2006/main">
+  <p:cSld>
+    <p:spTree>
+      <p:nvGrpSpPr>
+        <p:cNvPr id="1" name=""/>
+        <p:cNvGrpSpPr/>
+        <p:nvPr/>
+      </p:nvGrpSpPr>
+      <p:grpSpPr>
+        <a:xfrm>
+          <a:off x="0" y="0"/>
+          <a:ext cx="0" cy="0"/>
+          <a:chOff x="0" y="0"/>
+          <a:chExt cx="0" cy="0"/>
+        </a:xfrm>
+      </p:grpSpPr>
+      <p:pic>
+        <p:nvPicPr>
+          <p:cNvPr id="2" name="Picture 1">
+            <a:extLst>
+              <a:ext uri="{FF2B5EF4-FFF2-40B4-BE49-F238E27FC236}">
+                <a16:creationId xmlns:a16="http://schemas.microsoft.com/office/drawing/2014/main" id="{4197BDC2-C4AB-4F74-A854-2517652AC67E}"/>
+              </a:ext>
+            </a:extLst>
+          </p:cNvPr>
+          <p:cNvPicPr>
+            <a:picLocks noChangeAspect="1"/>
+          </p:cNvPicPr>
+          <p:nvPr/>
+        </p:nvPicPr>
+        <p:blipFill>
+          <a:blip r:embed="rId2"/>
+          <a:stretch>
+            <a:fillRect/>
+          </a:stretch>
+        </p:blipFill>
+        <p:spPr>
+          <a:xfrm>
+            <a:off x="521179" y="1278655"/>
+            <a:ext cx="6668078" cy="4762913"/>
+          </a:xfrm>
+          <a:prstGeom prst="rect">
+            <a:avLst/>
+          </a:prstGeom>
+        </p:spPr>
+      </p:pic>
+      <p:pic>
+        <p:nvPicPr>
+          <p:cNvPr id="8" name="Picture 7">
+            <a:extLst>
+              <a:ext uri="{FF2B5EF4-FFF2-40B4-BE49-F238E27FC236}">
+                <a16:creationId xmlns:a16="http://schemas.microsoft.com/office/drawing/2014/main" id="{D57E97FC-113A-4336-841D-CA4E46DE4423}"/>
+              </a:ext>
+            </a:extLst>
+          </p:cNvPr>
+          <p:cNvPicPr>
+            <a:picLocks noChangeAspect="1"/>
+          </p:cNvPicPr>
+          <p:nvPr/>
+        </p:nvPicPr>
+        <p:blipFill>
+          <a:blip r:embed="rId3"/>
+          <a:stretch>
+            <a:fillRect/>
+          </a:stretch>
+        </p:blipFill>
+        <p:spPr>
+          <a:xfrm>
+            <a:off x="7515521" y="1996107"/>
+            <a:ext cx="4275190" cy="3810330"/>
+          </a:xfrm>
+          <a:prstGeom prst="rect">
+            <a:avLst/>
+          </a:prstGeom>
+        </p:spPr>
+      </p:pic>
+    </p:spTree>
+    <p:extLst>
+      <p:ext uri="{BB962C8B-B14F-4D97-AF65-F5344CB8AC3E}">
+        <p14:creationId xmlns:p14="http://schemas.microsoft.com/office/powerpoint/2010/main" val="1227196819"/>
+      </p:ext>
+    </p:extLst>
+  </p:cSld>
+  <p:clrMapOvr>
+    <a:masterClrMapping/>
+  </p:clrMapOvr>
+</p:sld>
+</file>
+
+<file path=ppt/slides/slide4.xml><?xml version="1.0" encoding="utf-8"?>
+<p:sld xmlns:a="http://schemas.openxmlformats.org/drawingml/2006/main" xmlns:r="http://schemas.openxmlformats.org/officeDocument/2006/relationships" xmlns:p="http://schemas.openxmlformats.org/presentationml/2006/main">
+  <p:cSld>
+    <p:spTree>
+      <p:nvGrpSpPr>
+        <p:cNvPr id="1" name=""/>
+        <p:cNvGrpSpPr/>
+        <p:nvPr/>
+      </p:nvGrpSpPr>
+      <p:grpSpPr>
+        <a:xfrm>
+          <a:off x="0" y="0"/>
+          <a:ext cx="0" cy="0"/>
+          <a:chOff x="0" y="0"/>
+          <a:chExt cx="0" cy="0"/>
+        </a:xfrm>
+      </p:grpSpPr>
+      <p:pic>
+        <p:nvPicPr>
+          <p:cNvPr id="2" name="Picture 1">
+            <a:extLst>
+              <a:ext uri="{FF2B5EF4-FFF2-40B4-BE49-F238E27FC236}">
+                <a16:creationId xmlns:a16="http://schemas.microsoft.com/office/drawing/2014/main" id="{7CC41BE2-5E47-42B9-9083-9601F2B53685}"/>
+              </a:ext>
+            </a:extLst>
+          </p:cNvPr>
+          <p:cNvPicPr>
+            <a:picLocks noChangeAspect="1"/>
+          </p:cNvPicPr>
+          <p:nvPr/>
+        </p:nvPicPr>
+        <p:blipFill>
+          <a:blip r:embed="rId2"/>
+          <a:stretch>
+            <a:fillRect/>
+          </a:stretch>
+        </p:blipFill>
+        <p:spPr>
+          <a:xfrm>
+            <a:off x="485004" y="1727314"/>
+            <a:ext cx="5715495" cy="3810330"/>
+          </a:xfrm>
+          <a:prstGeom prst="rect">
+            <a:avLst/>
+          </a:prstGeom>
+        </p:spPr>
+      </p:pic>
+      <p:pic>
+        <p:nvPicPr>
+          <p:cNvPr id="3" name="Picture 2">
+            <a:extLst>
+              <a:ext uri="{FF2B5EF4-FFF2-40B4-BE49-F238E27FC236}">
+                <a16:creationId xmlns:a16="http://schemas.microsoft.com/office/drawing/2014/main" id="{44BF73C2-75DC-451C-98CD-E5D61D1FDEB6}"/>
+              </a:ext>
+            </a:extLst>
+          </p:cNvPr>
+          <p:cNvPicPr>
+            <a:picLocks noChangeAspect="1"/>
+          </p:cNvPicPr>
+          <p:nvPr/>
+        </p:nvPicPr>
+        <p:blipFill>
+          <a:blip r:embed="rId3"/>
+          <a:stretch>
+            <a:fillRect/>
+          </a:stretch>
+        </p:blipFill>
+        <p:spPr>
+          <a:xfrm>
+            <a:off x="6333145" y="1727314"/>
+            <a:ext cx="5715495" cy="3810330"/>
+          </a:xfrm>
+          <a:prstGeom prst="rect">
+            <a:avLst/>
+          </a:prstGeom>
+        </p:spPr>
+      </p:pic>
+    </p:spTree>
+    <p:extLst>
+      <p:ext uri="{BB962C8B-B14F-4D97-AF65-F5344CB8AC3E}">
+        <p14:creationId xmlns:p14="http://schemas.microsoft.com/office/powerpoint/2010/main" val="1700735331"/>
+      </p:ext>
+    </p:extLst>
+  </p:cSld>
+  <p:clrMapOvr>
+    <a:masterClrMapping/>
+  </p:clrMapOvr>
+</p:sld>
+</file>
+
+<file path=ppt/slides/slide5.xml><?xml version="1.0" encoding="utf-8"?>
+<p:sld xmlns:a="http://schemas.openxmlformats.org/drawingml/2006/main" xmlns:r="http://schemas.openxmlformats.org/officeDocument/2006/relationships" xmlns:p="http://schemas.openxmlformats.org/presentationml/2006/main">
+  <p:cSld>
+    <p:spTree>
+      <p:nvGrpSpPr>
+        <p:cNvPr id="1" name=""/>
+        <p:cNvGrpSpPr/>
+        <p:nvPr/>
+      </p:nvGrpSpPr>
+      <p:grpSpPr>
+        <a:xfrm>
+          <a:off x="0" y="0"/>
+          <a:ext cx="0" cy="0"/>
+          <a:chOff x="0" y="0"/>
+          <a:chExt cx="0" cy="0"/>
+        </a:xfrm>
+      </p:grpSpPr>
       <p:sp>
         <p:nvSpPr>
           <p:cNvPr id="2" name="Title 1">
@@ -5555,7 +5825,7 @@
 </p:sld>
 </file>
 
-<file path=ppt/slides/slide3.xml><?xml version="1.0" encoding="utf-8"?>
+<file path=ppt/slides/slide6.xml><?xml version="1.0" encoding="utf-8"?>
 <p:sld xmlns:a="http://schemas.openxmlformats.org/drawingml/2006/main" xmlns:r="http://schemas.openxmlformats.org/officeDocument/2006/relationships" xmlns:p="http://schemas.openxmlformats.org/presentationml/2006/main">
   <p:cSld>
     <p:spTree>
@@ -7410,7 +7680,7 @@
 </p:sld>
 </file>
 
-<file path=ppt/slides/slide4.xml><?xml version="1.0" encoding="utf-8"?>
+<file path=ppt/slides/slide7.xml><?xml version="1.0" encoding="utf-8"?>
 <p:sld xmlns:a="http://schemas.openxmlformats.org/drawingml/2006/main" xmlns:r="http://schemas.openxmlformats.org/officeDocument/2006/relationships" xmlns:p="http://schemas.openxmlformats.org/presentationml/2006/main">
   <p:cSld>
     <p:spTree>
@@ -7517,7 +7787,7 @@
           <p:nvPr>
             <p:extLst>
               <p:ext uri="{D42A27DB-BD31-4B8C-83A1-F6EECF244321}">
-                <p14:modId xmlns:p14="http://schemas.microsoft.com/office/powerpoint/2010/main" val="73541691"/>
+                <p14:modId xmlns:p14="http://schemas.microsoft.com/office/powerpoint/2010/main" val="2832351678"/>
               </p:ext>
             </p:extLst>
           </p:nvPr>
@@ -9494,7 +9764,7 @@
                     <a:bodyPr/>
                     <a:lstStyle/>
                     <a:p>
-                      <a:pPr algn="r" fontAlgn="b"/>
+                      <a:pPr algn="ctr" fontAlgn="b"/>
                       <a:r>
                         <a:rPr lang="en-US" sz="1600" b="0" i="0" u="none" strike="noStrike" dirty="0">
                           <a:solidFill>
@@ -9515,7 +9785,7 @@
                     <a:bodyPr/>
                     <a:lstStyle/>
                     <a:p>
-                      <a:pPr algn="r" fontAlgn="b"/>
+                      <a:pPr algn="ctr" fontAlgn="b"/>
                       <a:r>
                         <a:rPr lang="en-US" sz="1600" b="0" i="0" u="none" strike="noStrike" dirty="0">
                           <a:solidFill>
@@ -9573,6 +9843,7 @@
                     <a:bodyPr/>
                     <a:lstStyle/>
                     <a:p>
+                      <a:pPr algn="ctr"/>
                       <a:endParaRPr lang="en-US" sz="1600" dirty="0">
                         <a:solidFill>
                           <a:schemeClr val="tx1"/>
@@ -9597,276 +9868,6 @@
     <p:extLst>
       <p:ext uri="{BB962C8B-B14F-4D97-AF65-F5344CB8AC3E}">
         <p14:creationId xmlns:p14="http://schemas.microsoft.com/office/powerpoint/2010/main" val="3065006224"/>
-      </p:ext>
-    </p:extLst>
-  </p:cSld>
-  <p:clrMapOvr>
-    <a:masterClrMapping/>
-  </p:clrMapOvr>
-</p:sld>
-</file>
-
-<file path=ppt/slides/slide5.xml><?xml version="1.0" encoding="utf-8"?>
-<p:sld xmlns:a="http://schemas.openxmlformats.org/drawingml/2006/main" xmlns:r="http://schemas.openxmlformats.org/officeDocument/2006/relationships" xmlns:p="http://schemas.openxmlformats.org/presentationml/2006/main">
-  <p:cSld>
-    <p:spTree>
-      <p:nvGrpSpPr>
-        <p:cNvPr id="1" name=""/>
-        <p:cNvGrpSpPr/>
-        <p:nvPr/>
-      </p:nvGrpSpPr>
-      <p:grpSpPr>
-        <a:xfrm>
-          <a:off x="0" y="0"/>
-          <a:ext cx="0" cy="0"/>
-          <a:chOff x="0" y="0"/>
-          <a:chExt cx="0" cy="0"/>
-        </a:xfrm>
-      </p:grpSpPr>
-      <p:pic>
-        <p:nvPicPr>
-          <p:cNvPr id="2" name="Picture 1">
-            <a:extLst>
-              <a:ext uri="{FF2B5EF4-FFF2-40B4-BE49-F238E27FC236}">
-                <a16:creationId xmlns:a16="http://schemas.microsoft.com/office/drawing/2014/main" id="{E56CD687-9370-4A06-A7BD-1CE9DADE90D9}"/>
-              </a:ext>
-            </a:extLst>
-          </p:cNvPr>
-          <p:cNvPicPr>
-            <a:picLocks noChangeAspect="1"/>
-          </p:cNvPicPr>
-          <p:nvPr/>
-        </p:nvPicPr>
-        <p:blipFill>
-          <a:blip r:embed="rId2"/>
-          <a:stretch>
-            <a:fillRect/>
-          </a:stretch>
-        </p:blipFill>
-        <p:spPr>
-          <a:xfrm>
-            <a:off x="671904" y="1178172"/>
-            <a:ext cx="6668078" cy="4762913"/>
-          </a:xfrm>
-          <a:prstGeom prst="rect">
-            <a:avLst/>
-          </a:prstGeom>
-        </p:spPr>
-      </p:pic>
-      <p:pic>
-        <p:nvPicPr>
-          <p:cNvPr id="3" name="Picture 2">
-            <a:extLst>
-              <a:ext uri="{FF2B5EF4-FFF2-40B4-BE49-F238E27FC236}">
-                <a16:creationId xmlns:a16="http://schemas.microsoft.com/office/drawing/2014/main" id="{65E2493A-CACF-49E5-8FD5-DED353F2B703}"/>
-              </a:ext>
-            </a:extLst>
-          </p:cNvPr>
-          <p:cNvPicPr>
-            <a:picLocks noChangeAspect="1"/>
-          </p:cNvPicPr>
-          <p:nvPr/>
-        </p:nvPicPr>
-        <p:blipFill>
-          <a:blip r:embed="rId3"/>
-          <a:stretch>
-            <a:fillRect/>
-          </a:stretch>
-        </p:blipFill>
-        <p:spPr>
-          <a:xfrm>
-            <a:off x="7666247" y="1885576"/>
-            <a:ext cx="4275190" cy="3810330"/>
-          </a:xfrm>
-          <a:prstGeom prst="rect">
-            <a:avLst/>
-          </a:prstGeom>
-        </p:spPr>
-      </p:pic>
-    </p:spTree>
-    <p:extLst>
-      <p:ext uri="{BB962C8B-B14F-4D97-AF65-F5344CB8AC3E}">
-        <p14:creationId xmlns:p14="http://schemas.microsoft.com/office/powerpoint/2010/main" val="113611578"/>
-      </p:ext>
-    </p:extLst>
-  </p:cSld>
-  <p:clrMapOvr>
-    <a:masterClrMapping/>
-  </p:clrMapOvr>
-</p:sld>
-</file>
-
-<file path=ppt/slides/slide6.xml><?xml version="1.0" encoding="utf-8"?>
-<p:sld xmlns:a="http://schemas.openxmlformats.org/drawingml/2006/main" xmlns:r="http://schemas.openxmlformats.org/officeDocument/2006/relationships" xmlns:p="http://schemas.openxmlformats.org/presentationml/2006/main">
-  <p:cSld>
-    <p:spTree>
-      <p:nvGrpSpPr>
-        <p:cNvPr id="1" name=""/>
-        <p:cNvGrpSpPr/>
-        <p:nvPr/>
-      </p:nvGrpSpPr>
-      <p:grpSpPr>
-        <a:xfrm>
-          <a:off x="0" y="0"/>
-          <a:ext cx="0" cy="0"/>
-          <a:chOff x="0" y="0"/>
-          <a:chExt cx="0" cy="0"/>
-        </a:xfrm>
-      </p:grpSpPr>
-      <p:pic>
-        <p:nvPicPr>
-          <p:cNvPr id="2" name="Picture 1">
-            <a:extLst>
-              <a:ext uri="{FF2B5EF4-FFF2-40B4-BE49-F238E27FC236}">
-                <a16:creationId xmlns:a16="http://schemas.microsoft.com/office/drawing/2014/main" id="{4197BDC2-C4AB-4F74-A854-2517652AC67E}"/>
-              </a:ext>
-            </a:extLst>
-          </p:cNvPr>
-          <p:cNvPicPr>
-            <a:picLocks noChangeAspect="1"/>
-          </p:cNvPicPr>
-          <p:nvPr/>
-        </p:nvPicPr>
-        <p:blipFill>
-          <a:blip r:embed="rId2"/>
-          <a:stretch>
-            <a:fillRect/>
-          </a:stretch>
-        </p:blipFill>
-        <p:spPr>
-          <a:xfrm>
-            <a:off x="521179" y="1278655"/>
-            <a:ext cx="6668078" cy="4762913"/>
-          </a:xfrm>
-          <a:prstGeom prst="rect">
-            <a:avLst/>
-          </a:prstGeom>
-        </p:spPr>
-      </p:pic>
-      <p:pic>
-        <p:nvPicPr>
-          <p:cNvPr id="8" name="Picture 7">
-            <a:extLst>
-              <a:ext uri="{FF2B5EF4-FFF2-40B4-BE49-F238E27FC236}">
-                <a16:creationId xmlns:a16="http://schemas.microsoft.com/office/drawing/2014/main" id="{D57E97FC-113A-4336-841D-CA4E46DE4423}"/>
-              </a:ext>
-            </a:extLst>
-          </p:cNvPr>
-          <p:cNvPicPr>
-            <a:picLocks noChangeAspect="1"/>
-          </p:cNvPicPr>
-          <p:nvPr/>
-        </p:nvPicPr>
-        <p:blipFill>
-          <a:blip r:embed="rId3"/>
-          <a:stretch>
-            <a:fillRect/>
-          </a:stretch>
-        </p:blipFill>
-        <p:spPr>
-          <a:xfrm>
-            <a:off x="7515521" y="1996107"/>
-            <a:ext cx="4275190" cy="3810330"/>
-          </a:xfrm>
-          <a:prstGeom prst="rect">
-            <a:avLst/>
-          </a:prstGeom>
-        </p:spPr>
-      </p:pic>
-    </p:spTree>
-    <p:extLst>
-      <p:ext uri="{BB962C8B-B14F-4D97-AF65-F5344CB8AC3E}">
-        <p14:creationId xmlns:p14="http://schemas.microsoft.com/office/powerpoint/2010/main" val="1227196819"/>
-      </p:ext>
-    </p:extLst>
-  </p:cSld>
-  <p:clrMapOvr>
-    <a:masterClrMapping/>
-  </p:clrMapOvr>
-</p:sld>
-</file>
-
-<file path=ppt/slides/slide7.xml><?xml version="1.0" encoding="utf-8"?>
-<p:sld xmlns:a="http://schemas.openxmlformats.org/drawingml/2006/main" xmlns:r="http://schemas.openxmlformats.org/officeDocument/2006/relationships" xmlns:p="http://schemas.openxmlformats.org/presentationml/2006/main">
-  <p:cSld>
-    <p:spTree>
-      <p:nvGrpSpPr>
-        <p:cNvPr id="1" name=""/>
-        <p:cNvGrpSpPr/>
-        <p:nvPr/>
-      </p:nvGrpSpPr>
-      <p:grpSpPr>
-        <a:xfrm>
-          <a:off x="0" y="0"/>
-          <a:ext cx="0" cy="0"/>
-          <a:chOff x="0" y="0"/>
-          <a:chExt cx="0" cy="0"/>
-        </a:xfrm>
-      </p:grpSpPr>
-      <p:pic>
-        <p:nvPicPr>
-          <p:cNvPr id="2" name="Picture 1">
-            <a:extLst>
-              <a:ext uri="{FF2B5EF4-FFF2-40B4-BE49-F238E27FC236}">
-                <a16:creationId xmlns:a16="http://schemas.microsoft.com/office/drawing/2014/main" id="{7CC41BE2-5E47-42B9-9083-9601F2B53685}"/>
-              </a:ext>
-            </a:extLst>
-          </p:cNvPr>
-          <p:cNvPicPr>
-            <a:picLocks noChangeAspect="1"/>
-          </p:cNvPicPr>
-          <p:nvPr/>
-        </p:nvPicPr>
-        <p:blipFill>
-          <a:blip r:embed="rId2"/>
-          <a:stretch>
-            <a:fillRect/>
-          </a:stretch>
-        </p:blipFill>
-        <p:spPr>
-          <a:xfrm>
-            <a:off x="485004" y="1727314"/>
-            <a:ext cx="5715495" cy="3810330"/>
-          </a:xfrm>
-          <a:prstGeom prst="rect">
-            <a:avLst/>
-          </a:prstGeom>
-        </p:spPr>
-      </p:pic>
-      <p:pic>
-        <p:nvPicPr>
-          <p:cNvPr id="3" name="Picture 2">
-            <a:extLst>
-              <a:ext uri="{FF2B5EF4-FFF2-40B4-BE49-F238E27FC236}">
-                <a16:creationId xmlns:a16="http://schemas.microsoft.com/office/drawing/2014/main" id="{44BF73C2-75DC-451C-98CD-E5D61D1FDEB6}"/>
-              </a:ext>
-            </a:extLst>
-          </p:cNvPr>
-          <p:cNvPicPr>
-            <a:picLocks noChangeAspect="1"/>
-          </p:cNvPicPr>
-          <p:nvPr/>
-        </p:nvPicPr>
-        <p:blipFill>
-          <a:blip r:embed="rId3"/>
-          <a:stretch>
-            <a:fillRect/>
-          </a:stretch>
-        </p:blipFill>
-        <p:spPr>
-          <a:xfrm>
-            <a:off x="6333145" y="1727314"/>
-            <a:ext cx="5715495" cy="3810330"/>
-          </a:xfrm>
-          <a:prstGeom prst="rect">
-            <a:avLst/>
-          </a:prstGeom>
-        </p:spPr>
-      </p:pic>
-    </p:spTree>
-    <p:extLst>
-      <p:ext uri="{BB962C8B-B14F-4D97-AF65-F5344CB8AC3E}">
-        <p14:creationId xmlns:p14="http://schemas.microsoft.com/office/powerpoint/2010/main" val="1700735331"/>
       </p:ext>
     </p:extLst>
   </p:cSld>

</xml_diff>